<commit_message>
Fix link in Demo 1 slide deck
</commit_message>
<xml_diff>
--- a/01 httpclient.pptx
+++ b/01 httpclient.pptx
@@ -262,7 +262,7 @@
               <a:rPr lang="en-US" smtClean="0">
                 <a:latin typeface="Segoe UI" pitchFamily="34" charset="0"/>
               </a:rPr>
-              <a:t>1/7/19 3:41 PM</a:t>
+              <a:t>3/9/2019 6:29 AM</a:t>
             </a:fld>
             <a:endParaRPr lang="en-US" dirty="0">
               <a:latin typeface="Segoe UI" pitchFamily="34" charset="0"/>
@@ -559,7 +559,7 @@
           <a:p>
             <a:fld id="{D18B56EA-E28F-4F92-9F16-7A6F2501B303}" type="datetime8">
               <a:rPr lang="en-US" smtClean="0"/>
-              <a:t>1/7/19 3:41 PM</a:t>
+              <a:t>3/9/2019 6:29 AM</a:t>
             </a:fld>
             <a:endParaRPr lang="en-US" dirty="0"/>
           </a:p>
@@ -942,7 +942,7 @@
           <a:p>
             <a:fld id="{D18B56EA-E28F-4F92-9F16-7A6F2501B303}" type="datetime8">
               <a:rPr lang="en-US" smtClean="0"/>
-              <a:t>1/7/19 3:41 PM</a:t>
+              <a:t>3/9/2019 6:29 AM</a:t>
             </a:fld>
             <a:endParaRPr lang="en-US" dirty="0"/>
           </a:p>
@@ -1123,7 +1123,7 @@
           <a:p>
             <a:fld id="{D18B56EA-E28F-4F92-9F16-7A6F2501B303}" type="datetime8">
               <a:rPr lang="en-US" smtClean="0"/>
-              <a:t>1/7/19 3:41 PM</a:t>
+              <a:t>3/9/2019 6:29 AM</a:t>
             </a:fld>
             <a:endParaRPr lang="en-US" dirty="0"/>
           </a:p>
@@ -1466,7 +1466,7 @@
           <a:p>
             <a:fld id="{D18B56EA-E28F-4F92-9F16-7A6F2501B303}" type="datetime8">
               <a:rPr lang="en-US" smtClean="0"/>
-              <a:t>1/7/19 3:41 PM</a:t>
+              <a:t>3/9/2019 6:29 AM</a:t>
             </a:fld>
             <a:endParaRPr lang="en-US" dirty="0"/>
           </a:p>
@@ -1647,7 +1647,7 @@
           <a:p>
             <a:fld id="{D18B56EA-E28F-4F92-9F16-7A6F2501B303}" type="datetime8">
               <a:rPr lang="en-US" smtClean="0"/>
-              <a:t>1/7/19 3:41 PM</a:t>
+              <a:t>3/9/2019 6:29 AM</a:t>
             </a:fld>
             <a:endParaRPr lang="en-US" dirty="0"/>
           </a:p>
@@ -1828,7 +1828,7 @@
           <a:p>
             <a:fld id="{D18B56EA-E28F-4F92-9F16-7A6F2501B303}" type="datetime8">
               <a:rPr lang="en-US" smtClean="0"/>
-              <a:t>1/7/19 3:41 PM</a:t>
+              <a:t>3/9/2019 6:29 AM</a:t>
             </a:fld>
             <a:endParaRPr lang="en-US" dirty="0"/>
           </a:p>
@@ -2009,7 +2009,7 @@
           <a:p>
             <a:fld id="{D18B56EA-E28F-4F92-9F16-7A6F2501B303}" type="datetime8">
               <a:rPr lang="en-US" smtClean="0"/>
-              <a:t>1/7/19 3:41 PM</a:t>
+              <a:t>3/9/2019 6:29 AM</a:t>
             </a:fld>
             <a:endParaRPr lang="en-US" dirty="0"/>
           </a:p>
@@ -2190,7 +2190,7 @@
           <a:p>
             <a:fld id="{D18B56EA-E28F-4F92-9F16-7A6F2501B303}" type="datetime8">
               <a:rPr lang="en-US" smtClean="0"/>
-              <a:t>1/7/19 3:41 PM</a:t>
+              <a:t>3/9/2019 6:29 AM</a:t>
             </a:fld>
             <a:endParaRPr lang="en-US" dirty="0"/>
           </a:p>
@@ -16707,7 +16707,7 @@
               <a:rPr lang="en-US" sz="1800" dirty="0">
                 <a:latin typeface="+mj-lt"/>
               </a:rPr>
-              <a:t>SharePoint Framework</a:t>
+              <a:t>Overview of the SharePoint Framework</a:t>
             </a:r>
           </a:p>
           <a:p>
@@ -16726,7 +16726,7 @@
                 <a:latin typeface="+mj-lt"/>
                 <a:hlinkClick r:id="rId3"/>
               </a:rPr>
-              <a:t>https://docs.microsoft.com/sharepoint/dev/spfx</a:t>
+              <a:t>https://docs.microsoft.com/sharepoint/dev/spfx/sharepoint-framework-overview</a:t>
             </a:r>
             <a:endParaRPr lang="en-US" sz="1800" dirty="0">
               <a:latin typeface="+mj-lt"/>

</xml_diff>